<commit_message>
corrections and replacements for week 1
</commit_message>
<xml_diff>
--- a/PSYC121/data/Week_1/week 1 lecture slides.pptx
+++ b/PSYC121/data/Week_1/week 1 lecture slides.pptx
@@ -11,13 +11,13 @@
     <p:handoutMasterId r:id="rId24"/>
   </p:handoutMasterIdLst>
   <p:sldIdLst>
-    <p:sldId id="337" r:id="rId2"/>
-    <p:sldId id="338" r:id="rId3"/>
-    <p:sldId id="349" r:id="rId4"/>
-    <p:sldId id="333" r:id="rId5"/>
+    <p:sldId id="275" r:id="rId2"/>
+    <p:sldId id="337" r:id="rId3"/>
+    <p:sldId id="338" r:id="rId4"/>
+    <p:sldId id="349" r:id="rId5"/>
     <p:sldId id="297" r:id="rId6"/>
-    <p:sldId id="298" r:id="rId7"/>
-    <p:sldId id="340" r:id="rId8"/>
+    <p:sldId id="350" r:id="rId7"/>
+    <p:sldId id="298" r:id="rId8"/>
     <p:sldId id="341" r:id="rId9"/>
     <p:sldId id="342" r:id="rId10"/>
     <p:sldId id="343" r:id="rId11"/>
@@ -862,10 +862,10 @@
           <a:bodyPr/>
           <a:lstStyle/>
           <a:p>
-            <a:fld id="{03F1407C-56DB-0B42-A93F-038A2E27D893}" type="slidenum">
+            <a:fld id="{A556A96F-5E23-864C-8B85-032DB80D3329}" type="slidenum">
               <a:rPr lang="en-US"/>
               <a:pPr/>
-              <a:t>14</a:t>
+              <a:t>1</a:t>
             </a:fld>
             <a:endParaRPr lang="en-US"/>
           </a:p>
@@ -873,38 +873,21 @@
       </p:sp>
       <p:sp>
         <p:nvSpPr>
-          <p:cNvPr id="86018" name="Rectangle 2"/>
-          <p:cNvSpPr>
-            <a:spLocks noGrp="1" noRot="1" noChangeAspect="1" noChangeArrowheads="1"/>
+          <p:cNvPr id="53250" name="Rectangle 2"/>
+          <p:cNvSpPr>
+            <a:spLocks noGrp="1" noRot="1" noChangeAspect="1" noChangeArrowheads="1" noTextEdit="1"/>
           </p:cNvSpPr>
           <p:nvPr>
             <p:ph type="sldImg"/>
           </p:nvPr>
         </p:nvSpPr>
-        <p:spPr bwMode="auto">
-          <a:xfrm>
-            <a:off x="1143000" y="685800"/>
-            <a:ext cx="4572000" cy="3429000"/>
-          </a:xfrm>
-          <a:prstGeom prst="rect">
-            <a:avLst/>
-          </a:prstGeom>
-          <a:solidFill>
-            <a:srgbClr val="FFFFFF"/>
-          </a:solidFill>
-          <a:ln>
-            <a:solidFill>
-              <a:srgbClr val="000000"/>
-            </a:solidFill>
-            <a:miter lim="800000"/>
-            <a:headEnd/>
-            <a:tailEnd/>
-          </a:ln>
+        <p:spPr>
+          <a:ln/>
         </p:spPr>
       </p:sp>
       <p:sp>
         <p:nvSpPr>
-          <p:cNvPr id="86019" name="Rectangle 3"/>
+          <p:cNvPr id="53251" name="Rectangle 3"/>
           <p:cNvSpPr>
             <a:spLocks noGrp="1" noChangeArrowheads="1"/>
           </p:cNvSpPr>
@@ -912,39 +895,21 @@
             <p:ph type="body" idx="1"/>
           </p:nvPr>
         </p:nvSpPr>
-        <p:spPr bwMode="auto">
-          <a:xfrm>
-            <a:off x="914400" y="4343400"/>
-            <a:ext cx="5029200" cy="4114800"/>
-          </a:xfrm>
-          <a:prstGeom prst="rect">
-            <a:avLst/>
-          </a:prstGeom>
-          <a:solidFill>
-            <a:srgbClr val="FFFFFF"/>
-          </a:solidFill>
-          <a:ln>
-            <a:solidFill>
-              <a:srgbClr val="000000"/>
-            </a:solidFill>
-            <a:miter lim="800000"/>
-            <a:headEnd/>
-            <a:tailEnd/>
-          </a:ln>
-        </p:spPr>
-        <p:txBody>
-          <a:bodyPr>
-            <a:prstTxWarp prst="textNoShape">
-              <a:avLst/>
-            </a:prstTxWarp>
-          </a:bodyPr>
+        <p:spPr/>
+        <p:txBody>
+          <a:bodyPr/>
           <a:lstStyle/>
           <a:p>
-            <a:endParaRPr lang="en-US"/>
+            <a:endParaRPr lang="en-US" dirty="0"/>
           </a:p>
         </p:txBody>
       </p:sp>
     </p:spTree>
+    <p:extLst>
+      <p:ext uri="{BB962C8B-B14F-4D97-AF65-F5344CB8AC3E}">
+        <p14:creationId xmlns:p14="http://schemas.microsoft.com/office/powerpoint/2010/main" val="998639189"/>
+      </p:ext>
+    </p:extLst>
   </p:cSld>
   <p:clrMapOvr>
     <a:masterClrMapping/>
@@ -986,10 +951,10 @@
           <a:bodyPr/>
           <a:lstStyle/>
           <a:p>
-            <a:fld id="{088186B6-3F7C-9748-92FB-7D1427A0B214}" type="slidenum">
+            <a:fld id="{03F1407C-56DB-0B42-A93F-038A2E27D893}" type="slidenum">
               <a:rPr lang="en-US"/>
               <a:pPr/>
-              <a:t>15</a:t>
+              <a:t>14</a:t>
             </a:fld>
             <a:endParaRPr lang="en-US"/>
           </a:p>
@@ -997,7 +962,7 @@
       </p:sp>
       <p:sp>
         <p:nvSpPr>
-          <p:cNvPr id="88066" name="Rectangle 2"/>
+          <p:cNvPr id="86018" name="Rectangle 2"/>
           <p:cNvSpPr>
             <a:spLocks noGrp="1" noRot="1" noChangeAspect="1" noChangeArrowheads="1"/>
           </p:cNvSpPr>
@@ -1028,7 +993,7 @@
       </p:sp>
       <p:sp>
         <p:nvSpPr>
-          <p:cNvPr id="88067" name="Rectangle 3"/>
+          <p:cNvPr id="86019" name="Rectangle 3"/>
           <p:cNvSpPr>
             <a:spLocks noGrp="1" noChangeArrowheads="1"/>
           </p:cNvSpPr>
@@ -1077,6 +1042,130 @@
 </file>
 
 <file path=ppt/notesSlides/notesSlide3.xml><?xml version="1.0" encoding="utf-8"?>
+<p:notes xmlns:a="http://schemas.openxmlformats.org/drawingml/2006/main" xmlns:r="http://schemas.openxmlformats.org/officeDocument/2006/relationships" xmlns:p="http://schemas.openxmlformats.org/presentationml/2006/main">
+  <p:cSld>
+    <p:spTree>
+      <p:nvGrpSpPr>
+        <p:cNvPr id="1" name=""/>
+        <p:cNvGrpSpPr/>
+        <p:nvPr/>
+      </p:nvGrpSpPr>
+      <p:grpSpPr>
+        <a:xfrm>
+          <a:off x="0" y="0"/>
+          <a:ext cx="0" cy="0"/>
+          <a:chOff x="0" y="0"/>
+          <a:chExt cx="0" cy="0"/>
+        </a:xfrm>
+      </p:grpSpPr>
+      <p:sp>
+        <p:nvSpPr>
+          <p:cNvPr id="7" name="Rectangle 7"/>
+          <p:cNvSpPr>
+            <a:spLocks noGrp="1" noChangeArrowheads="1"/>
+          </p:cNvSpPr>
+          <p:nvPr>
+            <p:ph type="sldNum" sz="quarter" idx="5"/>
+          </p:nvPr>
+        </p:nvSpPr>
+        <p:spPr>
+          <a:ln/>
+        </p:spPr>
+        <p:txBody>
+          <a:bodyPr/>
+          <a:lstStyle/>
+          <a:p>
+            <a:fld id="{088186B6-3F7C-9748-92FB-7D1427A0B214}" type="slidenum">
+              <a:rPr lang="en-US"/>
+              <a:pPr/>
+              <a:t>15</a:t>
+            </a:fld>
+            <a:endParaRPr lang="en-US"/>
+          </a:p>
+        </p:txBody>
+      </p:sp>
+      <p:sp>
+        <p:nvSpPr>
+          <p:cNvPr id="88066" name="Rectangle 2"/>
+          <p:cNvSpPr>
+            <a:spLocks noGrp="1" noRot="1" noChangeAspect="1" noChangeArrowheads="1"/>
+          </p:cNvSpPr>
+          <p:nvPr>
+            <p:ph type="sldImg"/>
+          </p:nvPr>
+        </p:nvSpPr>
+        <p:spPr bwMode="auto">
+          <a:xfrm>
+            <a:off x="1143000" y="685800"/>
+            <a:ext cx="4572000" cy="3429000"/>
+          </a:xfrm>
+          <a:prstGeom prst="rect">
+            <a:avLst/>
+          </a:prstGeom>
+          <a:solidFill>
+            <a:srgbClr val="FFFFFF"/>
+          </a:solidFill>
+          <a:ln>
+            <a:solidFill>
+              <a:srgbClr val="000000"/>
+            </a:solidFill>
+            <a:miter lim="800000"/>
+            <a:headEnd/>
+            <a:tailEnd/>
+          </a:ln>
+        </p:spPr>
+      </p:sp>
+      <p:sp>
+        <p:nvSpPr>
+          <p:cNvPr id="88067" name="Rectangle 3"/>
+          <p:cNvSpPr>
+            <a:spLocks noGrp="1" noChangeArrowheads="1"/>
+          </p:cNvSpPr>
+          <p:nvPr>
+            <p:ph type="body" idx="1"/>
+          </p:nvPr>
+        </p:nvSpPr>
+        <p:spPr bwMode="auto">
+          <a:xfrm>
+            <a:off x="914400" y="4343400"/>
+            <a:ext cx="5029200" cy="4114800"/>
+          </a:xfrm>
+          <a:prstGeom prst="rect">
+            <a:avLst/>
+          </a:prstGeom>
+          <a:solidFill>
+            <a:srgbClr val="FFFFFF"/>
+          </a:solidFill>
+          <a:ln>
+            <a:solidFill>
+              <a:srgbClr val="000000"/>
+            </a:solidFill>
+            <a:miter lim="800000"/>
+            <a:headEnd/>
+            <a:tailEnd/>
+          </a:ln>
+        </p:spPr>
+        <p:txBody>
+          <a:bodyPr>
+            <a:prstTxWarp prst="textNoShape">
+              <a:avLst/>
+            </a:prstTxWarp>
+          </a:bodyPr>
+          <a:lstStyle/>
+          <a:p>
+            <a:endParaRPr lang="en-US"/>
+          </a:p>
+        </p:txBody>
+      </p:sp>
+    </p:spTree>
+  </p:cSld>
+  <p:clrMapOvr>
+    <a:masterClrMapping/>
+  </p:clrMapOvr>
+</p:notes>
+</file>
+
+<file path=ppt/notesSlides/notesSlide4.xml><?xml version="1.0" encoding="utf-8"?>
 <p:notes xmlns:a="http://schemas.openxmlformats.org/drawingml/2006/main" xmlns:r="http://schemas.openxmlformats.org/officeDocument/2006/relationships" xmlns:p="http://schemas.openxmlformats.org/presentationml/2006/main">
   <p:cSld>
     <p:spTree>
@@ -4307,7 +4396,63 @@
       </p:grpSpPr>
       <p:sp>
         <p:nvSpPr>
-          <p:cNvPr id="2" name="Title 1"/>
+          <p:cNvPr id="21511" name="Rectangle 1031"/>
+          <p:cNvSpPr>
+            <a:spLocks noChangeArrowheads="1"/>
+          </p:cNvSpPr>
+          <p:nvPr/>
+        </p:nvSpPr>
+        <p:spPr bwMode="auto">
+          <a:xfrm>
+            <a:off x="0" y="4379913"/>
+            <a:ext cx="9144000" cy="1225550"/>
+          </a:xfrm>
+          <a:prstGeom prst="rect">
+            <a:avLst/>
+          </a:prstGeom>
+          <a:noFill/>
+          <a:ln w="9525">
+            <a:noFill/>
+            <a:miter lim="800000"/>
+            <a:headEnd/>
+            <a:tailEnd/>
+          </a:ln>
+          <a:effectLst/>
+        </p:spPr>
+        <p:txBody>
+          <a:bodyPr>
+            <a:prstTxWarp prst="textNoShape">
+              <a:avLst/>
+            </a:prstTxWarp>
+          </a:bodyPr>
+          <a:lstStyle/>
+          <a:p>
+            <a:pPr marL="342900" indent="-342900" algn="ctr" eaLnBrk="1" hangingPunct="1">
+              <a:spcBef>
+                <a:spcPct val="20000"/>
+              </a:spcBef>
+            </a:pPr>
+            <a:r>
+              <a:rPr lang="en-GB" sz="3200" dirty="0">
+                <a:solidFill>
+                  <a:srgbClr val="000000"/>
+                </a:solidFill>
+                <a:latin typeface="Arial" pitchFamily="-108" charset="0"/>
+              </a:rPr>
+              <a:t>Hello!</a:t>
+            </a:r>
+          </a:p>
+        </p:txBody>
+      </p:sp>
+      <p:sp>
+        <p:nvSpPr>
+          <p:cNvPr id="4" name="Title 1">
+            <a:extLst>
+              <a:ext uri="{FF2B5EF4-FFF2-40B4-BE49-F238E27FC236}">
+                <a16:creationId xmlns:a16="http://schemas.microsoft.com/office/drawing/2014/main" id="{74F5576C-9893-164D-A2A2-239225546B82}"/>
+              </a:ext>
+            </a:extLst>
+          </p:cNvPr>
           <p:cNvSpPr>
             <a:spLocks noGrp="1"/>
           </p:cNvSpPr>
@@ -4315,59 +4460,38 @@
             <p:ph type="title"/>
           </p:nvPr>
         </p:nvSpPr>
-        <p:spPr/>
+        <p:spPr>
+          <a:xfrm>
+            <a:off x="26988" y="1889760"/>
+            <a:ext cx="9144000" cy="1143000"/>
+          </a:xfrm>
+        </p:spPr>
         <p:txBody>
           <a:bodyPr/>
           <a:lstStyle/>
           <a:p>
             <a:r>
-              <a:rPr lang="en-US" dirty="0"/>
-              <a:t>Welcome to Psychology</a:t>
-            </a:r>
-          </a:p>
-        </p:txBody>
-      </p:sp>
-      <p:sp>
-        <p:nvSpPr>
-          <p:cNvPr id="3" name="Content Placeholder 2"/>
-          <p:cNvSpPr>
-            <a:spLocks noGrp="1"/>
-          </p:cNvSpPr>
-          <p:nvPr>
-            <p:ph idx="1"/>
-          </p:nvPr>
-        </p:nvSpPr>
-        <p:spPr>
-          <a:xfrm>
-            <a:off x="0" y="1752600"/>
-            <a:ext cx="9144000" cy="4114800"/>
-          </a:xfrm>
-        </p:spPr>
-        <p:txBody>
-          <a:bodyPr/>
-          <a:lstStyle/>
-          <a:p>
-            <a:r>
-              <a:rPr lang="en-US" dirty="0"/>
-              <a:t>We hope you are going to enjoy your time in Lancaster, and with the Department</a:t>
-            </a:r>
-          </a:p>
-          <a:p>
-            <a:r>
-              <a:rPr lang="en-US" dirty="0"/>
-              <a:t>We hope you are going to learn a lot and enjoy this course about psychological analysis</a:t>
-            </a:r>
-          </a:p>
-          <a:p>
-            <a:r>
-              <a:rPr lang="en-US" dirty="0"/>
-              <a:t>Did I really use “analysis” and “enjoy” in the same sentence??</a:t>
-            </a:r>
-          </a:p>
-          <a:p>
-            <a:r>
-              <a:rPr lang="en-US" dirty="0"/>
-              <a:t>Can analysis be a useful, everyday tool?</a:t>
+              <a:rPr lang="en-GB" dirty="0">
+                <a:solidFill>
+                  <a:srgbClr val="222268"/>
+                </a:solidFill>
+              </a:rPr>
+              <a:t>PSYC 121, Week 1</a:t>
+            </a:r>
+            <a:br>
+              <a:rPr lang="en-GB" dirty="0">
+                <a:solidFill>
+                  <a:srgbClr val="222268"/>
+                </a:solidFill>
+              </a:rPr>
+            </a:br>
+            <a:r>
+              <a:rPr lang="en-GB" dirty="0">
+                <a:solidFill>
+                  <a:srgbClr val="222268"/>
+                </a:solidFill>
+              </a:rPr>
+              <a:t>2024 </a:t>
             </a:r>
           </a:p>
         </p:txBody>
@@ -4375,7 +4499,7 @@
     </p:spTree>
     <p:extLst>
       <p:ext uri="{BB962C8B-B14F-4D97-AF65-F5344CB8AC3E}">
-        <p14:creationId xmlns:p14="http://schemas.microsoft.com/office/powerpoint/2010/main" val="2910974080"/>
+        <p14:creationId xmlns:p14="http://schemas.microsoft.com/office/powerpoint/2010/main" val="3961216580"/>
       </p:ext>
     </p:extLst>
   </p:cSld>
@@ -4581,7 +4705,7 @@
             </a:pPr>
             <a:r>
               <a:rPr lang="en-GB" sz="2400" dirty="0"/>
-              <a:t>Nominal categorisation – Placing cases into named categories (e.g. sprinters could be categorised based on their nationality)</a:t>
+              <a:t>Nominal categorisation – Placing cases into named categories (e.g. high jumpers could be categorised based on their nationality)</a:t>
             </a:r>
           </a:p>
           <a:p>
@@ -4592,7 +4716,7 @@
             </a:pPr>
             <a:r>
               <a:rPr lang="en-GB" sz="2400" dirty="0"/>
-              <a:t>Ordinal categorisation – This ranks cases based on their order on a given variable (i.e. sprinters can be ranked 1st, 2nd, 3rd etc.)</a:t>
+              <a:t>Ordinal categorisation – This ranks cases based on their order on a given variable (i.e. high jumpers can be ranked 1st, 2nd, 3rd etc.)</a:t>
             </a:r>
           </a:p>
           <a:p>
@@ -4603,7 +4727,7 @@
             </a:pPr>
             <a:r>
               <a:rPr lang="en-GB" sz="2400" dirty="0"/>
-              <a:t>Interval categorisation – Where the distances between the sequential points on the scale are equal (e.g. the temperature at the time of the race)</a:t>
+              <a:t>Interval categorisation – Where the distances between the sequential points on the scale are equal (e.g. the temperature at the time of the event)</a:t>
             </a:r>
           </a:p>
           <a:p>
@@ -4614,15 +4738,7 @@
             </a:pPr>
             <a:r>
               <a:rPr lang="en-GB" sz="2400" dirty="0"/>
-              <a:t>Ratio categorisation – The same as interval categorisation, but with an absolute zero (e.g. the sprinters</a:t>
-            </a:r>
-            <a:r>
-              <a:rPr lang="ja-JP" altLang="en-GB" sz="2400" dirty="0"/>
-              <a:t>’</a:t>
-            </a:r>
-            <a:r>
-              <a:rPr lang="en-GB" sz="2400" dirty="0"/>
-              <a:t> best times)</a:t>
+              <a:t>Ratio categorisation – The same as interval categorisation, but with an absolute zero (e.g. height jumped successfully)</a:t>
             </a:r>
           </a:p>
         </p:txBody>
@@ -4952,7 +5068,7 @@
                   <p:embed/>
                   <p:pic>
                     <p:nvPicPr>
-                      <p:cNvPr id="0" name="Picture 4"/>
+                      <p:cNvPr id="84996" name="Object 1028" descr="Alternative symbol for mean (X bar)" title="symbol for mean"/>
                       <p:cNvPicPr>
                         <a:picLocks noChangeAspect="1" noChangeArrowheads="1"/>
                       </p:cNvPicPr>
@@ -4988,7 +5104,7 @@
                       <a:effectLst/>
                       <a:extLst>
                         <a:ext uri="{91240B29-F687-4f45-9708-019B960494DF}">
-                          <a14:hiddenLine xmlns="" xmlns:a14="http://schemas.microsoft.com/office/drawing/2010/main" w="9525">
+                          <a14:hiddenLine xmlns:a14="http://schemas.microsoft.com/office/drawing/2010/main" xmlns="" w="9525">
                             <a:solidFill>
                               <a:schemeClr val="bg1"/>
                             </a:solidFill>
@@ -4998,7 +5114,7 @@
                           </a14:hiddenLine>
                         </a:ext>
                         <a:ext uri="{AF507438-7753-43e0-B8FC-AC1667EBCBE1}">
-                          <a14:hiddenEffects xmlns="" xmlns:a14="http://schemas.microsoft.com/office/drawing/2010/main">
+                          <a14:hiddenEffects xmlns:a14="http://schemas.microsoft.com/office/drawing/2010/main" xmlns="">
                             <a:effectLst>
                               <a:outerShdw blurRad="63500" dist="38099" dir="2700000" algn="ctr" rotWithShape="0">
                                 <a:schemeClr val="bg2">
@@ -5555,32 +5671,6 @@
           <a:chExt cx="0" cy="0"/>
         </a:xfrm>
       </p:grpSpPr>
-      <p:pic>
-        <p:nvPicPr>
-          <p:cNvPr id="5" name="Picture 8" descr="visual depcition of a mean based on fulcrum balance" title="visual_mean"/>
-          <p:cNvPicPr>
-            <a:picLocks noChangeAspect="1" noChangeArrowheads="1"/>
-          </p:cNvPicPr>
-          <p:nvPr/>
-        </p:nvPicPr>
-        <p:blipFill>
-          <a:blip r:embed="rId3"/>
-          <a:srcRect/>
-          <a:stretch>
-            <a:fillRect/>
-          </a:stretch>
-        </p:blipFill>
-        <p:spPr bwMode="auto">
-          <a:xfrm>
-            <a:off x="5591600" y="2143521"/>
-            <a:ext cx="3057828" cy="1596755"/>
-          </a:xfrm>
-          <a:prstGeom prst="rect">
-            <a:avLst/>
-          </a:prstGeom>
-          <a:noFill/>
-        </p:spPr>
-      </p:pic>
       <p:sp>
         <p:nvSpPr>
           <p:cNvPr id="87043" name="Rectangle 1027"/>
@@ -5803,59 +5893,6 @@
                       </p:childTnLst>
                     </p:cTn>
                   </p:par>
-                  <p:par>
-                    <p:cTn id="13" fill="hold">
-                      <p:stCondLst>
-                        <p:cond delay="indefinite"/>
-                      </p:stCondLst>
-                      <p:childTnLst>
-                        <p:par>
-                          <p:cTn id="14" fill="hold">
-                            <p:stCondLst>
-                              <p:cond delay="0"/>
-                            </p:stCondLst>
-                            <p:childTnLst>
-                              <p:par>
-                                <p:cTn id="15" presetID="10" presetClass="entr" presetSubtype="0" fill="hold" nodeType="clickEffect">
-                                  <p:stCondLst>
-                                    <p:cond delay="0"/>
-                                  </p:stCondLst>
-                                  <p:childTnLst>
-                                    <p:set>
-                                      <p:cBhvr>
-                                        <p:cTn id="16" dur="1" fill="hold">
-                                          <p:stCondLst>
-                                            <p:cond delay="0"/>
-                                          </p:stCondLst>
-                                        </p:cTn>
-                                        <p:tgtEl>
-                                          <p:spTgt spid="5"/>
-                                        </p:tgtEl>
-                                        <p:attrNameLst>
-                                          <p:attrName>style.visibility</p:attrName>
-                                        </p:attrNameLst>
-                                      </p:cBhvr>
-                                      <p:to>
-                                        <p:strVal val="visible"/>
-                                      </p:to>
-                                    </p:set>
-                                    <p:animEffect transition="in" filter="fade">
-                                      <p:cBhvr>
-                                        <p:cTn id="17" dur="1000"/>
-                                        <p:tgtEl>
-                                          <p:spTgt spid="5"/>
-                                        </p:tgtEl>
-                                      </p:cBhvr>
-                                    </p:animEffect>
-                                  </p:childTnLst>
-                                </p:cTn>
-                              </p:par>
-                            </p:childTnLst>
-                          </p:cTn>
-                        </p:par>
-                      </p:childTnLst>
-                    </p:cTn>
-                  </p:par>
                 </p:childTnLst>
               </p:cTn>
               <p:prevCondLst>
@@ -5901,89 +5938,6 @@
           <a:chExt cx="0" cy="0"/>
         </a:xfrm>
       </p:grpSpPr>
-      <p:pic>
-        <p:nvPicPr>
-          <p:cNvPr id="4" name="Picture 7" descr="Formula for mean" title="formula for mean"/>
-          <p:cNvPicPr>
-            <a:picLocks noChangeAspect="1" noChangeArrowheads="1"/>
-          </p:cNvPicPr>
-          <p:nvPr/>
-        </p:nvPicPr>
-        <p:blipFill>
-          <a:blip r:embed="rId2"/>
-          <a:srcRect/>
-          <a:stretch>
-            <a:fillRect/>
-          </a:stretch>
-        </p:blipFill>
-        <p:spPr bwMode="auto">
-          <a:xfrm>
-            <a:off x="6014863" y="5290183"/>
-            <a:ext cx="2209800" cy="1249363"/>
-          </a:xfrm>
-          <a:prstGeom prst="rect">
-            <a:avLst/>
-          </a:prstGeom>
-          <a:noFill/>
-        </p:spPr>
-      </p:pic>
-      <p:graphicFrame>
-        <p:nvGraphicFramePr>
-          <p:cNvPr id="5" name="Object 4" descr="Formula for mean using X bar notation" title="formula for mean"/>
-          <p:cNvGraphicFramePr>
-            <a:graphicFrameLocks noChangeAspect="1"/>
-          </p:cNvGraphicFramePr>
-          <p:nvPr>
-            <p:extLst>
-              <p:ext uri="{D42A27DB-BD31-4B8C-83A1-F6EECF244321}">
-                <p14:modId xmlns:p14="http://schemas.microsoft.com/office/powerpoint/2010/main" val="2930322085"/>
-              </p:ext>
-            </p:extLst>
-          </p:nvPr>
-        </p:nvGraphicFramePr>
-        <p:xfrm>
-          <a:off x="6810274" y="442315"/>
-          <a:ext cx="2055884" cy="1541913"/>
-        </p:xfrm>
-        <a:graphic>
-          <a:graphicData uri="http://schemas.openxmlformats.org/presentationml/2006/ole">
-            <mc:AlternateContent xmlns:mc="http://schemas.openxmlformats.org/markup-compatibility/2006">
-              <mc:Choice xmlns:v="urn:schemas-microsoft-com:vml" Requires="v">
-                <p:oleObj name="Equation" r:id="rId3" imgW="609600" imgH="457200" progId="Equation.3">
-                  <p:embed/>
-                </p:oleObj>
-              </mc:Choice>
-              <mc:Fallback>
-                <p:oleObj name="Equation" r:id="rId3" imgW="609600" imgH="457200" progId="Equation.3">
-                  <p:embed/>
-                  <p:pic>
-                    <p:nvPicPr>
-                      <p:cNvPr id="0" name=""/>
-                      <p:cNvPicPr/>
-                      <p:nvPr/>
-                    </p:nvPicPr>
-                    <p:blipFill>
-                      <a:blip r:embed="rId4"/>
-                      <a:stretch>
-                        <a:fillRect/>
-                      </a:stretch>
-                    </p:blipFill>
-                    <p:spPr>
-                      <a:xfrm>
-                        <a:off x="6810274" y="442315"/>
-                        <a:ext cx="2055884" cy="1541913"/>
-                      </a:xfrm>
-                      <a:prstGeom prst="rect">
-                        <a:avLst/>
-                      </a:prstGeom>
-                    </p:spPr>
-                  </p:pic>
-                </p:oleObj>
-              </mc:Fallback>
-            </mc:AlternateContent>
-          </a:graphicData>
-        </a:graphic>
-      </p:graphicFrame>
       <p:sp>
         <p:nvSpPr>
           <p:cNvPr id="3" name="Content Placeholder 2"/>
@@ -6354,59 +6308,6 @@
                                               <p:pRg st="5" end="5"/>
                                             </p:txEl>
                                           </p:spTgt>
-                                        </p:tgtEl>
-                                      </p:cBhvr>
-                                    </p:animEffect>
-                                  </p:childTnLst>
-                                </p:cTn>
-                              </p:par>
-                            </p:childTnLst>
-                          </p:cTn>
-                        </p:par>
-                      </p:childTnLst>
-                    </p:cTn>
-                  </p:par>
-                  <p:par>
-                    <p:cTn id="23" fill="hold">
-                      <p:stCondLst>
-                        <p:cond delay="indefinite"/>
-                      </p:stCondLst>
-                      <p:childTnLst>
-                        <p:par>
-                          <p:cTn id="24" fill="hold">
-                            <p:stCondLst>
-                              <p:cond delay="0"/>
-                            </p:stCondLst>
-                            <p:childTnLst>
-                              <p:par>
-                                <p:cTn id="25" presetID="9" presetClass="entr" presetSubtype="0" fill="hold" nodeType="clickEffect">
-                                  <p:stCondLst>
-                                    <p:cond delay="0"/>
-                                  </p:stCondLst>
-                                  <p:childTnLst>
-                                    <p:set>
-                                      <p:cBhvr>
-                                        <p:cTn id="26" dur="1" fill="hold">
-                                          <p:stCondLst>
-                                            <p:cond delay="0"/>
-                                          </p:stCondLst>
-                                        </p:cTn>
-                                        <p:tgtEl>
-                                          <p:spTgt spid="5"/>
-                                        </p:tgtEl>
-                                        <p:attrNameLst>
-                                          <p:attrName>style.visibility</p:attrName>
-                                        </p:attrNameLst>
-                                      </p:cBhvr>
-                                      <p:to>
-                                        <p:strVal val="visible"/>
-                                      </p:to>
-                                    </p:set>
-                                    <p:animEffect transition="in" filter="dissolve">
-                                      <p:cBhvr>
-                                        <p:cTn id="27" dur="500"/>
-                                        <p:tgtEl>
-                                          <p:spTgt spid="5"/>
                                         </p:tgtEl>
                                       </p:cBhvr>
                                     </p:animEffect>
@@ -6982,58 +6883,6 @@
           <a:chExt cx="0" cy="0"/>
         </a:xfrm>
       </p:grpSpPr>
-      <p:pic>
-        <p:nvPicPr>
-          <p:cNvPr id="5" name="Picture 8" descr="visual depiction of mode" title="mode visualised"/>
-          <p:cNvPicPr>
-            <a:picLocks noChangeAspect="1" noChangeArrowheads="1"/>
-          </p:cNvPicPr>
-          <p:nvPr/>
-        </p:nvPicPr>
-        <p:blipFill>
-          <a:blip r:embed="rId2"/>
-          <a:srcRect/>
-          <a:stretch>
-            <a:fillRect/>
-          </a:stretch>
-        </p:blipFill>
-        <p:spPr bwMode="auto">
-          <a:xfrm>
-            <a:off x="2892557" y="5261245"/>
-            <a:ext cx="3057828" cy="1596755"/>
-          </a:xfrm>
-          <a:prstGeom prst="rect">
-            <a:avLst/>
-          </a:prstGeom>
-          <a:noFill/>
-        </p:spPr>
-      </p:pic>
-      <p:pic>
-        <p:nvPicPr>
-          <p:cNvPr id="4" name="Picture 7" descr="reminder of image of mean"/>
-          <p:cNvPicPr>
-            <a:picLocks noChangeAspect="1" noChangeArrowheads="1"/>
-          </p:cNvPicPr>
-          <p:nvPr/>
-        </p:nvPicPr>
-        <p:blipFill>
-          <a:blip r:embed="rId3"/>
-          <a:srcRect/>
-          <a:stretch>
-            <a:fillRect/>
-          </a:stretch>
-        </p:blipFill>
-        <p:spPr bwMode="auto">
-          <a:xfrm>
-            <a:off x="6478785" y="3680195"/>
-            <a:ext cx="2486602" cy="1074520"/>
-          </a:xfrm>
-          <a:prstGeom prst="rect">
-            <a:avLst/>
-          </a:prstGeom>
-          <a:noFill/>
-        </p:spPr>
-      </p:pic>
       <p:sp>
         <p:nvSpPr>
           <p:cNvPr id="3" name="Content Placeholder 2"/>
@@ -7360,112 +7209,6 @@
                       </p:childTnLst>
                     </p:cTn>
                   </p:par>
-                  <p:par>
-                    <p:cTn id="23" fill="hold">
-                      <p:stCondLst>
-                        <p:cond delay="indefinite"/>
-                      </p:stCondLst>
-                      <p:childTnLst>
-                        <p:par>
-                          <p:cTn id="24" fill="hold">
-                            <p:stCondLst>
-                              <p:cond delay="0"/>
-                            </p:stCondLst>
-                            <p:childTnLst>
-                              <p:par>
-                                <p:cTn id="25" presetID="10" presetClass="entr" presetSubtype="0" fill="hold" nodeType="clickEffect">
-                                  <p:stCondLst>
-                                    <p:cond delay="0"/>
-                                  </p:stCondLst>
-                                  <p:childTnLst>
-                                    <p:set>
-                                      <p:cBhvr>
-                                        <p:cTn id="26" dur="1" fill="hold">
-                                          <p:stCondLst>
-                                            <p:cond delay="0"/>
-                                          </p:stCondLst>
-                                        </p:cTn>
-                                        <p:tgtEl>
-                                          <p:spTgt spid="4"/>
-                                        </p:tgtEl>
-                                        <p:attrNameLst>
-                                          <p:attrName>style.visibility</p:attrName>
-                                        </p:attrNameLst>
-                                      </p:cBhvr>
-                                      <p:to>
-                                        <p:strVal val="visible"/>
-                                      </p:to>
-                                    </p:set>
-                                    <p:animEffect transition="in" filter="fade">
-                                      <p:cBhvr>
-                                        <p:cTn id="27" dur="1000"/>
-                                        <p:tgtEl>
-                                          <p:spTgt spid="4"/>
-                                        </p:tgtEl>
-                                      </p:cBhvr>
-                                    </p:animEffect>
-                                  </p:childTnLst>
-                                </p:cTn>
-                              </p:par>
-                            </p:childTnLst>
-                          </p:cTn>
-                        </p:par>
-                      </p:childTnLst>
-                    </p:cTn>
-                  </p:par>
-                  <p:par>
-                    <p:cTn id="28" fill="hold">
-                      <p:stCondLst>
-                        <p:cond delay="indefinite"/>
-                      </p:stCondLst>
-                      <p:childTnLst>
-                        <p:par>
-                          <p:cTn id="29" fill="hold">
-                            <p:stCondLst>
-                              <p:cond delay="0"/>
-                            </p:stCondLst>
-                            <p:childTnLst>
-                              <p:par>
-                                <p:cTn id="30" presetID="10" presetClass="entr" presetSubtype="0" fill="hold" nodeType="clickEffect">
-                                  <p:stCondLst>
-                                    <p:cond delay="0"/>
-                                  </p:stCondLst>
-                                  <p:childTnLst>
-                                    <p:set>
-                                      <p:cBhvr>
-                                        <p:cTn id="31" dur="1" fill="hold">
-                                          <p:stCondLst>
-                                            <p:cond delay="0"/>
-                                          </p:stCondLst>
-                                        </p:cTn>
-                                        <p:tgtEl>
-                                          <p:spTgt spid="5"/>
-                                        </p:tgtEl>
-                                        <p:attrNameLst>
-                                          <p:attrName>style.visibility</p:attrName>
-                                        </p:attrNameLst>
-                                      </p:cBhvr>
-                                      <p:to>
-                                        <p:strVal val="visible"/>
-                                      </p:to>
-                                    </p:set>
-                                    <p:animEffect transition="in" filter="fade">
-                                      <p:cBhvr>
-                                        <p:cTn id="32" dur="1000"/>
-                                        <p:tgtEl>
-                                          <p:spTgt spid="5"/>
-                                        </p:tgtEl>
-                                      </p:cBhvr>
-                                    </p:animEffect>
-                                  </p:childTnLst>
-                                </p:cTn>
-                              </p:par>
-                            </p:childTnLst>
-                          </p:cTn>
-                        </p:par>
-                      </p:childTnLst>
-                    </p:cTn>
-                  </p:par>
                 </p:childTnLst>
               </p:cTn>
               <p:prevCondLst>
@@ -7579,6 +7322,20 @@
             <a:pPr lvl="1"/>
             <a:r>
               <a:rPr lang="en-GB" dirty="0"/>
+              <a:t>Examples where the mean isn’t possible</a:t>
+            </a:r>
+          </a:p>
+          <a:p>
+            <a:pPr lvl="1"/>
+            <a:r>
+              <a:rPr lang="en-GB" dirty="0"/>
+              <a:t>Examples where the mean isn’t meaningful</a:t>
+            </a:r>
+          </a:p>
+          <a:p>
+            <a:pPr lvl="1"/>
+            <a:r>
+              <a:rPr lang="en-GB" dirty="0"/>
               <a:t>Questions without a simple answer</a:t>
             </a:r>
           </a:p>
@@ -7587,20 +7344,6 @@
             <a:r>
               <a:rPr lang="en-GB" dirty="0"/>
               <a:t>Examples of where some measures may be misleading or controversial</a:t>
-            </a:r>
-          </a:p>
-          <a:p>
-            <a:pPr lvl="1"/>
-            <a:r>
-              <a:rPr lang="en-GB" dirty="0"/>
-              <a:t>Examples where the mean isn’t meaningful</a:t>
-            </a:r>
-          </a:p>
-          <a:p>
-            <a:pPr lvl="1"/>
-            <a:r>
-              <a:rPr lang="en-GB" dirty="0"/>
-              <a:t>Examples where the mean isn’t possible</a:t>
             </a:r>
           </a:p>
         </p:txBody>
@@ -8046,7 +7789,7 @@
           <a:p>
             <a:r>
               <a:rPr lang="en-US" dirty="0"/>
-              <a:t>How to succeed with Analysis</a:t>
+              <a:t>Welcome to Psychology</a:t>
             </a:r>
           </a:p>
         </p:txBody>
@@ -8061,39 +7804,40 @@
             <p:ph idx="1"/>
           </p:nvPr>
         </p:nvSpPr>
-        <p:spPr/>
+        <p:spPr>
+          <a:xfrm>
+            <a:off x="0" y="1752600"/>
+            <a:ext cx="9144000" cy="4114800"/>
+          </a:xfrm>
+        </p:spPr>
         <p:txBody>
           <a:bodyPr/>
           <a:lstStyle/>
           <a:p>
             <a:r>
               <a:rPr lang="en-US" dirty="0"/>
-              <a:t>Keep up with the lectures</a:t>
+              <a:t>We hope you are going to enjoy your time in Lancaster, and with the Department</a:t>
             </a:r>
           </a:p>
           <a:p>
             <a:r>
               <a:rPr lang="en-US" dirty="0"/>
-              <a:t>Apply yourself in the lab classes</a:t>
-            </a:r>
+              <a:t>We hope you are going to learn a lot and enjoy this course about psychological analysis</a:t>
+            </a:r>
+          </a:p>
+          <a:p>
+            <a:endParaRPr lang="en-US" dirty="0"/>
           </a:p>
           <a:p>
             <a:r>
               <a:rPr lang="en-US" dirty="0"/>
-              <a:t>Keep practicing until ideas fall into place</a:t>
+              <a:t>Did I really use “analysis” and “enjoy” in the same sentence??</a:t>
             </a:r>
           </a:p>
           <a:p>
             <a:r>
               <a:rPr lang="en-US" dirty="0"/>
-              <a:t>Please don’t misinterpret this course to be just about numbers and calculations</a:t>
-            </a:r>
-          </a:p>
-          <a:p>
-            <a:pPr lvl="1"/>
-            <a:r>
-              <a:rPr lang="en-US" dirty="0"/>
-              <a:t>It’s actually about ideas and problem solving and being thoughtful</a:t>
+              <a:t>Can analysis be a useful, everyday tool?</a:t>
             </a:r>
           </a:p>
         </p:txBody>
@@ -8101,7 +7845,7 @@
     </p:spTree>
     <p:extLst>
       <p:ext uri="{BB962C8B-B14F-4D97-AF65-F5344CB8AC3E}">
-        <p14:creationId xmlns:p14="http://schemas.microsoft.com/office/powerpoint/2010/main" val="857818638"/>
+        <p14:creationId xmlns:p14="http://schemas.microsoft.com/office/powerpoint/2010/main" val="2910974080"/>
       </p:ext>
     </p:extLst>
   </p:cSld>
@@ -8152,7 +7896,13 @@
       </p:sp>
       <p:pic>
         <p:nvPicPr>
-          <p:cNvPr id="4" name="Content Placeholder 3" descr="example of advert potentially misleading userd about central tendencey" title="churchill car insurance advert"/>
+          <p:cNvPr id="6" name="Content Placeholder 3" descr="example of advert potentially misleading userd about central tendencey" title="churchill car insurance advert">
+            <a:extLst>
+              <a:ext uri="{FF2B5EF4-FFF2-40B4-BE49-F238E27FC236}">
+                <a16:creationId xmlns:a16="http://schemas.microsoft.com/office/drawing/2014/main" id="{88C28826-E82B-85CE-6EBC-66F4AA6C8DDF}"/>
+              </a:ext>
+            </a:extLst>
+          </p:cNvPr>
           <p:cNvPicPr>
             <a:picLocks noGrp="1" noChangeAspect="1"/>
           </p:cNvPicPr>
@@ -8899,7 +8649,7 @@
           <a:p>
             <a:r>
               <a:rPr lang="en-US" dirty="0"/>
-              <a:t>Structure of Analysis course</a:t>
+              <a:t>How to succeed with Analysis</a:t>
             </a:r>
           </a:p>
         </p:txBody>
@@ -8914,151 +8664,39 @@
             <p:ph idx="1"/>
           </p:nvPr>
         </p:nvSpPr>
-        <p:spPr>
-          <a:xfrm>
-            <a:off x="0" y="1981200"/>
-            <a:ext cx="9144000" cy="4114800"/>
-          </a:xfrm>
-        </p:spPr>
+        <p:spPr/>
         <p:txBody>
           <a:bodyPr/>
           <a:lstStyle/>
           <a:p>
-            <a:pPr marL="0" indent="0">
-              <a:buNone/>
-            </a:pPr>
-            <a:r>
-              <a:rPr lang="en-US" sz="2400" dirty="0"/>
-              <a:t>Week 1-5:	Introduction to analysis (</a:t>
-            </a:r>
-            <a:r>
-              <a:rPr lang="en-US" sz="2400" dirty="0">
-                <a:solidFill>
-                  <a:srgbClr val="C00000"/>
-                </a:solidFill>
-              </a:rPr>
-              <a:t>John </a:t>
-            </a:r>
-            <a:r>
-              <a:rPr lang="en-US" sz="2400" dirty="0" err="1">
-                <a:solidFill>
-                  <a:srgbClr val="C00000"/>
-                </a:solidFill>
-              </a:rPr>
-              <a:t>Towse</a:t>
-            </a:r>
-            <a:r>
-              <a:rPr lang="en-US" sz="2400" dirty="0"/>
-              <a:t>)</a:t>
-            </a:r>
-            <a:endParaRPr lang="en-US" sz="2800" dirty="0"/>
-          </a:p>
-          <a:p>
-            <a:pPr marL="0" indent="0">
-              <a:buNone/>
-            </a:pPr>
-            <a:r>
-              <a:rPr lang="en-US" sz="2400" dirty="0"/>
-              <a:t>Week 6-10	Testing for differences (</a:t>
-            </a:r>
-            <a:r>
-              <a:rPr lang="en-US" sz="2400" dirty="0">
-                <a:solidFill>
-                  <a:srgbClr val="C00000"/>
-                </a:solidFill>
-              </a:rPr>
-              <a:t>Tom </a:t>
-            </a:r>
-            <a:r>
-              <a:rPr lang="en-US" sz="2400" dirty="0" err="1">
-                <a:solidFill>
-                  <a:srgbClr val="C00000"/>
-                </a:solidFill>
-              </a:rPr>
-              <a:t>Beesley</a:t>
-            </a:r>
-            <a:r>
-              <a:rPr lang="en-US" sz="2400" dirty="0"/>
-              <a:t>)</a:t>
-            </a:r>
-          </a:p>
-          <a:p>
-            <a:pPr marL="0" indent="0">
-              <a:buNone/>
-            </a:pPr>
-            <a:endParaRPr lang="en-US" sz="2400" dirty="0"/>
-          </a:p>
-          <a:p>
-            <a:pPr marL="0" indent="0" algn="ctr">
-              <a:buNone/>
-            </a:pPr>
-            <a:r>
-              <a:rPr lang="en-US" sz="2400" dirty="0"/>
-              <a:t>Christmas break!</a:t>
-            </a:r>
-          </a:p>
-          <a:p>
-            <a:pPr marL="0" indent="0">
-              <a:buNone/>
-            </a:pPr>
-            <a:endParaRPr lang="en-US" sz="2400" dirty="0"/>
-          </a:p>
-          <a:p>
-            <a:pPr marL="0" indent="0">
-              <a:buNone/>
-            </a:pPr>
-            <a:r>
-              <a:rPr lang="en-US" sz="2400" dirty="0"/>
-              <a:t>Week 11-15	Testing for associations (</a:t>
-            </a:r>
-            <a:r>
-              <a:rPr lang="en-US" sz="2400" dirty="0" err="1">
-                <a:solidFill>
-                  <a:srgbClr val="C00000"/>
-                </a:solidFill>
-              </a:rPr>
-              <a:t>Margriet</a:t>
-            </a:r>
-            <a:r>
-              <a:rPr lang="en-US" sz="2400" dirty="0">
-                <a:solidFill>
-                  <a:srgbClr val="C00000"/>
-                </a:solidFill>
-              </a:rPr>
-              <a:t> </a:t>
-            </a:r>
-            <a:r>
-              <a:rPr lang="en-US" sz="2400" dirty="0" err="1">
-                <a:solidFill>
-                  <a:srgbClr val="C00000"/>
-                </a:solidFill>
-              </a:rPr>
-              <a:t>Groen</a:t>
-            </a:r>
-            <a:r>
-              <a:rPr lang="en-US" sz="2400" dirty="0"/>
-              <a:t>)</a:t>
-            </a:r>
-          </a:p>
-          <a:p>
-            <a:pPr marL="0" indent="0">
-              <a:buNone/>
-            </a:pPr>
-            <a:r>
-              <a:rPr lang="en-US" sz="2400" dirty="0"/>
-              <a:t>Week 16-20	Using and interpreting statistical information (</a:t>
-            </a:r>
-            <a:r>
-              <a:rPr lang="en-US" sz="2400" dirty="0">
-                <a:solidFill>
-                  <a:srgbClr val="C00000"/>
-                </a:solidFill>
-              </a:rPr>
-              <a:t>Rob Davies</a:t>
-            </a:r>
-            <a:r>
-              <a:rPr lang="en-US" sz="2400" dirty="0"/>
-              <a:t>)</a:t>
+            <a:r>
+              <a:rPr lang="en-US" dirty="0"/>
+              <a:t>Keep up with the lectures</a:t>
+            </a:r>
+          </a:p>
+          <a:p>
+            <a:r>
+              <a:rPr lang="en-US" dirty="0"/>
+              <a:t>Apply yourself in the lab classes</a:t>
+            </a:r>
+          </a:p>
+          <a:p>
+            <a:r>
+              <a:rPr lang="en-US" dirty="0"/>
+              <a:t>Keep practicing until ideas fall into place</a:t>
+            </a:r>
+          </a:p>
+          <a:p>
+            <a:r>
+              <a:rPr lang="en-US" dirty="0"/>
+              <a:t>Please don’t misinterpret this course to be just about numbers and calculations</a:t>
+            </a:r>
+          </a:p>
+          <a:p>
+            <a:pPr lvl="1"/>
+            <a:r>
+              <a:rPr lang="en-US" dirty="0"/>
+              <a:t>It’s actually about ideas and problem solving and being thoughtful</a:t>
             </a:r>
           </a:p>
         </p:txBody>
@@ -9066,7 +8704,7 @@
     </p:spTree>
     <p:extLst>
       <p:ext uri="{BB962C8B-B14F-4D97-AF65-F5344CB8AC3E}">
-        <p14:creationId xmlns:p14="http://schemas.microsoft.com/office/powerpoint/2010/main" val="1289669161"/>
+        <p14:creationId xmlns:p14="http://schemas.microsoft.com/office/powerpoint/2010/main" val="857818638"/>
       </p:ext>
     </p:extLst>
   </p:cSld>
@@ -9110,7 +8748,7 @@
           <a:p>
             <a:r>
               <a:rPr lang="en-US" dirty="0"/>
-              <a:t>Evidence in psychology</a:t>
+              <a:t>Structure of Part 1 analysis</a:t>
             </a:r>
           </a:p>
         </p:txBody>
@@ -9125,34 +8763,161 @@
             <p:ph idx="1"/>
           </p:nvPr>
         </p:nvSpPr>
-        <p:spPr/>
+        <p:spPr>
+          <a:xfrm>
+            <a:off x="0" y="1981200"/>
+            <a:ext cx="9144000" cy="4114800"/>
+          </a:xfrm>
+        </p:spPr>
         <p:txBody>
           <a:bodyPr/>
           <a:lstStyle/>
           <a:p>
-            <a:r>
-              <a:rPr lang="en-US" dirty="0"/>
-              <a:t>"In listening to stories we tend to suspend disbelief in order to be entertained, whereas in evaluating statistics we generally have an opposite inclination to suspend belief in order not to be beguiled.”</a:t>
-            </a:r>
-          </a:p>
-          <a:p>
-            <a:pPr lvl="1"/>
-            <a:r>
-              <a:rPr lang="en-US" sz="2000" dirty="0"/>
-              <a:t>John Allen </a:t>
-            </a:r>
-            <a:r>
-              <a:rPr lang="en-US" sz="2000" dirty="0" err="1"/>
-              <a:t>Paulos</a:t>
-            </a:r>
-            <a:r>
-              <a:rPr lang="en-US" sz="2000" dirty="0"/>
-              <a:t>, in Stories vs. statistics, New York Times, 24 October 2010</a:t>
+            <a:pPr marL="0" indent="0">
+              <a:buNone/>
+            </a:pPr>
+            <a:r>
+              <a:rPr lang="en-US" sz="2400" dirty="0"/>
+              <a:t>Week 1-5:	Introduction to analysis (</a:t>
+            </a:r>
+            <a:r>
+              <a:rPr lang="en-US" sz="2400" dirty="0">
+                <a:solidFill>
+                  <a:srgbClr val="C00000"/>
+                </a:solidFill>
+              </a:rPr>
+              <a:t>John </a:t>
+            </a:r>
+            <a:r>
+              <a:rPr lang="en-US" sz="2400" dirty="0" err="1">
+                <a:solidFill>
+                  <a:srgbClr val="C00000"/>
+                </a:solidFill>
+              </a:rPr>
+              <a:t>Towse</a:t>
+            </a:r>
+            <a:r>
+              <a:rPr lang="en-US" sz="2400" dirty="0"/>
+              <a:t>)</a:t>
+            </a:r>
+            <a:endParaRPr lang="en-US" sz="2800" dirty="0"/>
+          </a:p>
+          <a:p>
+            <a:pPr marL="0" indent="0">
+              <a:buNone/>
+            </a:pPr>
+            <a:r>
+              <a:rPr lang="en-US" sz="2400" dirty="0"/>
+              <a:t>Week 6-10	Testing for differences (</a:t>
+            </a:r>
+            <a:r>
+              <a:rPr lang="en-US" sz="2400" dirty="0">
+                <a:solidFill>
+                  <a:srgbClr val="C00000"/>
+                </a:solidFill>
+              </a:rPr>
+              <a:t>Tom </a:t>
+            </a:r>
+            <a:r>
+              <a:rPr lang="en-US" sz="2400" dirty="0" err="1">
+                <a:solidFill>
+                  <a:srgbClr val="C00000"/>
+                </a:solidFill>
+              </a:rPr>
+              <a:t>Beesley</a:t>
+            </a:r>
+            <a:r>
+              <a:rPr lang="en-US" sz="2400" dirty="0"/>
+              <a:t>)</a:t>
+            </a:r>
+          </a:p>
+          <a:p>
+            <a:pPr marL="0" indent="0">
+              <a:buNone/>
+            </a:pPr>
+            <a:endParaRPr lang="en-US" sz="2400" dirty="0"/>
+          </a:p>
+          <a:p>
+            <a:pPr marL="0" indent="0" algn="ctr">
+              <a:buNone/>
+            </a:pPr>
+            <a:r>
+              <a:rPr lang="en-US" sz="2400" dirty="0"/>
+              <a:t>Christmas break!</a:t>
+            </a:r>
+          </a:p>
+          <a:p>
+            <a:pPr marL="0" indent="0">
+              <a:buNone/>
+            </a:pPr>
+            <a:endParaRPr lang="en-US" sz="2400" dirty="0"/>
+          </a:p>
+          <a:p>
+            <a:pPr marL="0" indent="0">
+              <a:buNone/>
+            </a:pPr>
+            <a:r>
+              <a:rPr lang="en-US" sz="2400" dirty="0"/>
+              <a:t>Week 11-15	Testing for associations (</a:t>
+            </a:r>
+            <a:r>
+              <a:rPr lang="en-US" sz="2400" dirty="0" err="1">
+                <a:solidFill>
+                  <a:srgbClr val="C00000"/>
+                </a:solidFill>
+              </a:rPr>
+              <a:t>Margriet</a:t>
+            </a:r>
+            <a:r>
+              <a:rPr lang="en-US" sz="2400" dirty="0">
+                <a:solidFill>
+                  <a:srgbClr val="C00000"/>
+                </a:solidFill>
+              </a:rPr>
+              <a:t> </a:t>
+            </a:r>
+            <a:r>
+              <a:rPr lang="en-US" sz="2400" dirty="0" err="1">
+                <a:solidFill>
+                  <a:srgbClr val="C00000"/>
+                </a:solidFill>
+              </a:rPr>
+              <a:t>Groen</a:t>
+            </a:r>
+            <a:r>
+              <a:rPr lang="en-US" sz="2400" dirty="0"/>
+              <a:t>)</a:t>
+            </a:r>
+          </a:p>
+          <a:p>
+            <a:pPr marL="0" indent="0">
+              <a:buNone/>
+            </a:pPr>
+            <a:r>
+              <a:rPr lang="en-US" sz="2400" dirty="0"/>
+              <a:t>Week 16-20	Using / interpreting statistics (</a:t>
+            </a:r>
+            <a:r>
+              <a:rPr lang="en-US" sz="2400" dirty="0">
+                <a:solidFill>
+                  <a:srgbClr val="C00000"/>
+                </a:solidFill>
+              </a:rPr>
+              <a:t>Rob Davies</a:t>
+            </a:r>
+            <a:r>
+              <a:rPr lang="en-US" sz="2400" dirty="0"/>
+              <a:t>)</a:t>
             </a:r>
           </a:p>
         </p:txBody>
       </p:sp>
     </p:spTree>
+    <p:extLst>
+      <p:ext uri="{BB962C8B-B14F-4D97-AF65-F5344CB8AC3E}">
+        <p14:creationId xmlns:p14="http://schemas.microsoft.com/office/powerpoint/2010/main" val="1289669161"/>
+      </p:ext>
+    </p:extLst>
   </p:cSld>
   <p:clrMapOvr>
     <a:masterClrMapping/>
@@ -9194,7 +8959,7 @@
           <a:p>
             <a:r>
               <a:rPr lang="en-US" dirty="0"/>
-              <a:t>Overview of next three weeks</a:t>
+              <a:t>Overview of next four weeks</a:t>
             </a:r>
           </a:p>
         </p:txBody>
@@ -9211,7 +8976,7 @@
         </p:nvSpPr>
         <p:spPr>
           <a:xfrm>
-            <a:off x="515924" y="1981200"/>
+            <a:off x="360281" y="1752600"/>
             <a:ext cx="7942276" cy="4114800"/>
           </a:xfrm>
         </p:spPr>
@@ -9263,6 +9028,13 @@
             <a:r>
               <a:rPr lang="en-US" dirty="0"/>
               <a:t>Describing where one number falls in a set of numbers</a:t>
+            </a:r>
+          </a:p>
+          <a:p>
+            <a:pPr lvl="1"/>
+            <a:r>
+              <a:rPr lang="en-US" dirty="0"/>
+              <a:t>The principle of hypothesis testing</a:t>
             </a:r>
           </a:p>
         </p:txBody>
@@ -9292,6 +9064,66 @@
           <a:chExt cx="0" cy="0"/>
         </a:xfrm>
       </p:grpSpPr>
+      <p:pic>
+        <p:nvPicPr>
+          <p:cNvPr id="3" name="Picture 2" descr="A screenshot of a computer&#10;&#10;Description automatically generated">
+            <a:extLst>
+              <a:ext uri="{FF2B5EF4-FFF2-40B4-BE49-F238E27FC236}">
+                <a16:creationId xmlns:a16="http://schemas.microsoft.com/office/drawing/2014/main" id="{79CB3352-AD38-3C61-512F-330373032CC7}"/>
+              </a:ext>
+            </a:extLst>
+          </p:cNvPr>
+          <p:cNvPicPr>
+            <a:picLocks noChangeAspect="1"/>
+          </p:cNvPicPr>
+          <p:nvPr/>
+        </p:nvPicPr>
+        <p:blipFill>
+          <a:blip r:embed="rId2"/>
+          <a:stretch>
+            <a:fillRect/>
+          </a:stretch>
+        </p:blipFill>
+        <p:spPr>
+          <a:xfrm>
+            <a:off x="0" y="1084836"/>
+            <a:ext cx="9144000" cy="4688326"/>
+          </a:xfrm>
+          <a:prstGeom prst="rect">
+            <a:avLst/>
+          </a:prstGeom>
+        </p:spPr>
+      </p:pic>
+    </p:spTree>
+    <p:extLst>
+      <p:ext uri="{BB962C8B-B14F-4D97-AF65-F5344CB8AC3E}">
+        <p14:creationId xmlns:p14="http://schemas.microsoft.com/office/powerpoint/2010/main" val="729074709"/>
+      </p:ext>
+    </p:extLst>
+  </p:cSld>
+  <p:clrMapOvr>
+    <a:masterClrMapping/>
+  </p:clrMapOvr>
+</p:sld>
+</file>
+
+<file path=ppt/slides/slide7.xml><?xml version="1.0" encoding="utf-8"?>
+<p:sld xmlns:a="http://schemas.openxmlformats.org/drawingml/2006/main" xmlns:r="http://schemas.openxmlformats.org/officeDocument/2006/relationships" xmlns:p="http://schemas.openxmlformats.org/presentationml/2006/main">
+  <p:cSld>
+    <p:spTree>
+      <p:nvGrpSpPr>
+        <p:cNvPr id="1" name=""/>
+        <p:cNvGrpSpPr/>
+        <p:nvPr/>
+      </p:nvGrpSpPr>
+      <p:grpSpPr>
+        <a:xfrm>
+          <a:off x="0" y="0"/>
+          <a:ext cx="0" cy="0"/>
+          <a:chOff x="0" y="0"/>
+          <a:chExt cx="0" cy="0"/>
+        </a:xfrm>
+      </p:grpSpPr>
       <p:sp>
         <p:nvSpPr>
           <p:cNvPr id="2" name="Title 1"/>
@@ -9340,18 +9172,21 @@
             </a:r>
           </a:p>
           <a:p>
+            <a:pPr lvl="1"/>
             <a:r>
               <a:rPr lang="en-US" dirty="0"/>
               <a:t>Understand distinctions between types of data</a:t>
             </a:r>
           </a:p>
           <a:p>
+            <a:pPr lvl="1"/>
             <a:r>
               <a:rPr lang="en-US" dirty="0"/>
               <a:t>Be aware of some key notations for discussing numbers</a:t>
             </a:r>
           </a:p>
           <a:p>
+            <a:pPr lvl="1"/>
             <a:r>
               <a:rPr lang="en-US" dirty="0"/>
               <a:t>Be aware of measures of central tendency</a:t>
@@ -9427,33 +9262,15 @@
                                   </p:childTnLst>
                                 </p:cTn>
                               </p:par>
-                            </p:childTnLst>
-                          </p:cTn>
-                        </p:par>
-                      </p:childTnLst>
-                    </p:cTn>
-                  </p:par>
-                  <p:par>
-                    <p:cTn id="8" fill="hold">
-                      <p:stCondLst>
-                        <p:cond delay="indefinite"/>
-                      </p:stCondLst>
-                      <p:childTnLst>
-                        <p:par>
-                          <p:cTn id="9" fill="hold">
-                            <p:stCondLst>
-                              <p:cond delay="0"/>
-                            </p:stCondLst>
-                            <p:childTnLst>
                               <p:par>
-                                <p:cTn id="10" presetID="10" presetClass="entr" presetSubtype="0" fill="hold" grpId="0" nodeType="clickEffect">
+                                <p:cTn id="8" presetID="10" presetClass="entr" presetSubtype="0" fill="hold" grpId="0" nodeType="withEffect">
                                   <p:stCondLst>
                                     <p:cond delay="0"/>
                                   </p:stCondLst>
                                   <p:childTnLst>
                                     <p:set>
                                       <p:cBhvr>
-                                        <p:cTn id="11" dur="1" fill="hold">
+                                        <p:cTn id="9" dur="1" fill="hold">
                                           <p:stCondLst>
                                             <p:cond delay="0"/>
                                           </p:stCondLst>
@@ -9475,7 +9292,7 @@
                                     </p:set>
                                     <p:animEffect transition="in" filter="fade">
                                       <p:cBhvr>
-                                        <p:cTn id="12" dur="1000"/>
+                                        <p:cTn id="10" dur="1000"/>
                                         <p:tgtEl>
                                           <p:spTgt spid="3">
                                             <p:txEl>
@@ -9488,33 +9305,15 @@
                                   </p:childTnLst>
                                 </p:cTn>
                               </p:par>
-                            </p:childTnLst>
-                          </p:cTn>
-                        </p:par>
-                      </p:childTnLst>
-                    </p:cTn>
-                  </p:par>
-                  <p:par>
-                    <p:cTn id="13" fill="hold">
-                      <p:stCondLst>
-                        <p:cond delay="indefinite"/>
-                      </p:stCondLst>
-                      <p:childTnLst>
-                        <p:par>
-                          <p:cTn id="14" fill="hold">
-                            <p:stCondLst>
-                              <p:cond delay="0"/>
-                            </p:stCondLst>
-                            <p:childTnLst>
                               <p:par>
-                                <p:cTn id="15" presetID="10" presetClass="entr" presetSubtype="0" fill="hold" grpId="0" nodeType="clickEffect">
+                                <p:cTn id="11" presetID="10" presetClass="entr" presetSubtype="0" fill="hold" grpId="0" nodeType="withEffect">
                                   <p:stCondLst>
                                     <p:cond delay="0"/>
                                   </p:stCondLst>
                                   <p:childTnLst>
                                     <p:set>
                                       <p:cBhvr>
-                                        <p:cTn id="16" dur="1" fill="hold">
+                                        <p:cTn id="12" dur="1" fill="hold">
                                           <p:stCondLst>
                                             <p:cond delay="0"/>
                                           </p:stCondLst>
@@ -9536,7 +9335,7 @@
                                     </p:set>
                                     <p:animEffect transition="in" filter="fade">
                                       <p:cBhvr>
-                                        <p:cTn id="17" dur="1000"/>
+                                        <p:cTn id="13" dur="1000"/>
                                         <p:tgtEl>
                                           <p:spTgt spid="3">
                                             <p:txEl>
@@ -9549,33 +9348,15 @@
                                   </p:childTnLst>
                                 </p:cTn>
                               </p:par>
-                            </p:childTnLst>
-                          </p:cTn>
-                        </p:par>
-                      </p:childTnLst>
-                    </p:cTn>
-                  </p:par>
-                  <p:par>
-                    <p:cTn id="18" fill="hold">
-                      <p:stCondLst>
-                        <p:cond delay="indefinite"/>
-                      </p:stCondLst>
-                      <p:childTnLst>
-                        <p:par>
-                          <p:cTn id="19" fill="hold">
-                            <p:stCondLst>
-                              <p:cond delay="0"/>
-                            </p:stCondLst>
-                            <p:childTnLst>
                               <p:par>
-                                <p:cTn id="20" presetID="10" presetClass="entr" presetSubtype="0" fill="hold" grpId="0" nodeType="clickEffect">
+                                <p:cTn id="14" presetID="10" presetClass="entr" presetSubtype="0" fill="hold" grpId="0" nodeType="withEffect">
                                   <p:stCondLst>
                                     <p:cond delay="0"/>
                                   </p:stCondLst>
                                   <p:childTnLst>
                                     <p:set>
                                       <p:cBhvr>
-                                        <p:cTn id="21" dur="1" fill="hold">
+                                        <p:cTn id="15" dur="1" fill="hold">
                                           <p:stCondLst>
                                             <p:cond delay="0"/>
                                           </p:stCondLst>
@@ -9597,7 +9378,7 @@
                                     </p:set>
                                     <p:animEffect transition="in" filter="fade">
                                       <p:cBhvr>
-                                        <p:cTn id="22" dur="1000"/>
+                                        <p:cTn id="16" dur="1000"/>
                                         <p:tgtEl>
                                           <p:spTgt spid="3">
                                             <p:txEl>
@@ -9644,132 +9425,6 @@
 </p:sld>
 </file>
 
-<file path=ppt/slides/slide7.xml><?xml version="1.0" encoding="utf-8"?>
-<p:sld xmlns:a="http://schemas.openxmlformats.org/drawingml/2006/main" xmlns:r="http://schemas.openxmlformats.org/officeDocument/2006/relationships" xmlns:p="http://schemas.openxmlformats.org/presentationml/2006/main">
-  <p:cSld>
-    <p:spTree>
-      <p:nvGrpSpPr>
-        <p:cNvPr id="1" name=""/>
-        <p:cNvGrpSpPr/>
-        <p:nvPr/>
-      </p:nvGrpSpPr>
-      <p:grpSpPr>
-        <a:xfrm>
-          <a:off x="0" y="0"/>
-          <a:ext cx="0" cy="0"/>
-          <a:chOff x="0" y="0"/>
-          <a:chExt cx="0" cy="0"/>
-        </a:xfrm>
-      </p:grpSpPr>
-      <p:sp>
-        <p:nvSpPr>
-          <p:cNvPr id="3074" name="Rectangle 2"/>
-          <p:cNvSpPr>
-            <a:spLocks noGrp="1" noChangeArrowheads="1"/>
-          </p:cNvSpPr>
-          <p:nvPr>
-            <p:ph type="title" idx="4294967295"/>
-          </p:nvPr>
-        </p:nvSpPr>
-        <p:spPr/>
-        <p:txBody>
-          <a:bodyPr/>
-          <a:lstStyle/>
-          <a:p>
-            <a:pPr eaLnBrk="1" hangingPunct="1"/>
-            <a:r>
-              <a:rPr lang="en-GB"/>
-              <a:t>Overview </a:t>
-            </a:r>
-            <a:endParaRPr lang="en-US"/>
-          </a:p>
-        </p:txBody>
-      </p:sp>
-      <p:sp>
-        <p:nvSpPr>
-          <p:cNvPr id="3075" name="Rectangle 3"/>
-          <p:cNvSpPr>
-            <a:spLocks noGrp="1" noChangeArrowheads="1"/>
-          </p:cNvSpPr>
-          <p:nvPr>
-            <p:ph type="body" idx="4294967295"/>
-          </p:nvPr>
-        </p:nvSpPr>
-        <p:spPr>
-          <a:xfrm>
-            <a:off x="428625" y="1412875"/>
-            <a:ext cx="8382000" cy="4741863"/>
-          </a:xfrm>
-        </p:spPr>
-        <p:txBody>
-          <a:bodyPr/>
-          <a:lstStyle/>
-          <a:p>
-            <a:pPr marL="296863" indent="-296863" eaLnBrk="1" hangingPunct="1"/>
-            <a:r>
-              <a:rPr lang="en-GB"/>
-              <a:t>Variables can be anything that vary</a:t>
-            </a:r>
-          </a:p>
-          <a:p>
-            <a:pPr marL="296863" indent="-296863" eaLnBrk="1" hangingPunct="1"/>
-            <a:endParaRPr lang="en-GB"/>
-          </a:p>
-          <a:p>
-            <a:pPr marL="296863" indent="-296863" eaLnBrk="1" hangingPunct="1"/>
-            <a:r>
-              <a:rPr lang="en-GB"/>
-              <a:t>This lecture considers:</a:t>
-            </a:r>
-          </a:p>
-          <a:p>
-            <a:pPr lvl="1" eaLnBrk="1" hangingPunct="1"/>
-            <a:r>
-              <a:rPr lang="en-GB"/>
-              <a:t>Types of data</a:t>
-            </a:r>
-          </a:p>
-          <a:p>
-            <a:pPr lvl="1" eaLnBrk="1" hangingPunct="1"/>
-            <a:r>
-              <a:rPr lang="en-GB"/>
-              <a:t>Different scales of measurement</a:t>
-            </a:r>
-          </a:p>
-          <a:p>
-            <a:pPr lvl="1" eaLnBrk="1" hangingPunct="1"/>
-            <a:r>
-              <a:rPr lang="en-GB"/>
-              <a:t>The different functions of statistics   </a:t>
-            </a:r>
-          </a:p>
-          <a:p>
-            <a:pPr marL="296863" indent="-296863" eaLnBrk="1" hangingPunct="1"/>
-            <a:endParaRPr lang="en-GB"/>
-          </a:p>
-          <a:p>
-            <a:pPr marL="296863" indent="-296863" eaLnBrk="1" hangingPunct="1"/>
-            <a:r>
-              <a:rPr lang="en-GB"/>
-              <a:t>The need to understand the characteristics of each of your variables is emphasised</a:t>
-            </a:r>
-            <a:endParaRPr lang="en-US"/>
-          </a:p>
-        </p:txBody>
-      </p:sp>
-    </p:spTree>
-    <p:extLst>
-      <p:ext uri="{BB962C8B-B14F-4D97-AF65-F5344CB8AC3E}">
-        <p14:creationId xmlns:p14="http://schemas.microsoft.com/office/powerpoint/2010/main" val="1564218119"/>
-      </p:ext>
-    </p:extLst>
-  </p:cSld>
-  <p:clrMapOvr>
-    <a:masterClrMapping/>
-  </p:clrMapOvr>
-</p:sld>
-</file>
-
 <file path=ppt/slides/slide8.xml><?xml version="1.0" encoding="utf-8"?>
 <p:sld xmlns:a="http://schemas.openxmlformats.org/drawingml/2006/main" xmlns:r="http://schemas.openxmlformats.org/officeDocument/2006/relationships" xmlns:p="http://schemas.openxmlformats.org/presentationml/2006/main">
   <p:cSld>
@@ -9823,7 +9478,7 @@
         </p:nvSpPr>
         <p:spPr>
           <a:xfrm>
-            <a:off x="178614" y="1412875"/>
+            <a:off x="178614" y="2238375"/>
             <a:ext cx="8965386" cy="4117975"/>
           </a:xfrm>
         </p:spPr>
@@ -9871,11 +9526,11 @@
             <a:pPr eaLnBrk="1" hangingPunct="1"/>
             <a:r>
               <a:rPr lang="en-GB" dirty="0"/>
-              <a:t>Examples are gender, eye colour, socio-economic status, marital status and nationality</a:t>
-            </a:r>
-          </a:p>
-          <a:p>
-            <a:pPr eaLnBrk="1" hangingPunct="1"/>
+              <a:t>Examples are eye colour, socio-economic status, marital status and nationality. </a:t>
+            </a:r>
+          </a:p>
+          <a:p>
+            <a:pPr lvl="1"/>
             <a:r>
               <a:rPr lang="en-GB" dirty="0"/>
               <a:t>Nominal variables are also referred to as categorical or qualitative variables </a:t>
@@ -9950,7 +9605,7 @@
         </p:nvSpPr>
         <p:spPr>
           <a:xfrm>
-            <a:off x="428625" y="1412875"/>
+            <a:off x="492125" y="2098675"/>
             <a:ext cx="8382000" cy="4575175"/>
           </a:xfrm>
         </p:spPr>
@@ -9960,7 +9615,7 @@
           <a:p>
             <a:pPr eaLnBrk="1" hangingPunct="1"/>
             <a:r>
-              <a:rPr lang="en-GB"/>
+              <a:rPr lang="en-GB" dirty="0"/>
               <a:t>The second type of data is called </a:t>
             </a:r>
             <a:r>
@@ -9968,7 +9623,7 @@
               <a:t>‘</a:t>
             </a:r>
             <a:r>
-              <a:rPr lang="en-GB"/>
+              <a:rPr lang="en-GB" dirty="0"/>
               <a:t>numerical</a:t>
             </a:r>
             <a:r>
@@ -9976,35 +9631,35 @@
               <a:t>’</a:t>
             </a:r>
             <a:r>
-              <a:rPr lang="en-GB"/>
+              <a:rPr lang="en-GB" dirty="0"/>
               <a:t> data</a:t>
             </a:r>
           </a:p>
           <a:p>
             <a:pPr eaLnBrk="1" hangingPunct="1"/>
             <a:r>
-              <a:rPr lang="en-GB"/>
+              <a:rPr lang="en-GB" dirty="0"/>
               <a:t>Numerical variables are those in which a case is assigned a numerical value </a:t>
             </a:r>
           </a:p>
           <a:p>
             <a:pPr eaLnBrk="1" hangingPunct="1"/>
             <a:r>
-              <a:rPr lang="en-GB"/>
+              <a:rPr lang="en-GB" dirty="0"/>
               <a:t>Examples are age, height, weight, IQ, test scores, income, distance or temperature </a:t>
             </a:r>
           </a:p>
           <a:p>
             <a:pPr eaLnBrk="1" hangingPunct="1"/>
             <a:r>
-              <a:rPr lang="en-GB"/>
+              <a:rPr lang="en-GB" dirty="0"/>
               <a:t>Numerical variables are also referred to as score or quantitative variables </a:t>
             </a:r>
-            <a:endParaRPr lang="en-US"/>
+            <a:endParaRPr lang="en-US" dirty="0"/>
           </a:p>
           <a:p>
             <a:pPr eaLnBrk="1" hangingPunct="1"/>
-            <a:endParaRPr lang="en-US"/>
+            <a:endParaRPr lang="en-US" dirty="0"/>
           </a:p>
         </p:txBody>
       </p:sp>

</xml_diff>